<commit_message>
Use incorrect request syntax in system overview (fixes #21)
</commit_message>
<xml_diff>
--- a/docs/userguide/docs/basics_images/event_loop.pptx
+++ b/docs/userguide/docs/basics_images/event_loop.pptx
@@ -5,8 +5,7 @@
     <p:sldMasterId id="2147483648" r:id="rId1"/>
   </p:sldMasterIdLst>
   <p:sldIdLst>
-    <p:sldId id="256" r:id="rId2"/>
-    <p:sldId id="257" r:id="rId3"/>
+    <p:sldId id="257" r:id="rId2"/>
   </p:sldIdLst>
   <p:sldSz cx="12192000" cy="6858000"/>
   <p:notesSz cx="6858000" cy="9144000"/>
@@ -262,7 +261,7 @@
           <a:p>
             <a:fld id="{1BFFCDDA-1F42-48E8-80CE-21DA24509F0D}" type="datetimeFigureOut">
               <a:rPr lang="en-US" smtClean="0"/>
-              <a:t>11/1/2021</a:t>
+              <a:t>11/20/2021</a:t>
             </a:fld>
             <a:endParaRPr lang="en-US"/>
           </a:p>
@@ -462,7 +461,7 @@
           <a:p>
             <a:fld id="{1BFFCDDA-1F42-48E8-80CE-21DA24509F0D}" type="datetimeFigureOut">
               <a:rPr lang="en-US" smtClean="0"/>
-              <a:t>11/1/2021</a:t>
+              <a:t>11/20/2021</a:t>
             </a:fld>
             <a:endParaRPr lang="en-US"/>
           </a:p>
@@ -672,7 +671,7 @@
           <a:p>
             <a:fld id="{1BFFCDDA-1F42-48E8-80CE-21DA24509F0D}" type="datetimeFigureOut">
               <a:rPr lang="en-US" smtClean="0"/>
-              <a:t>11/1/2021</a:t>
+              <a:t>11/20/2021</a:t>
             </a:fld>
             <a:endParaRPr lang="en-US"/>
           </a:p>
@@ -872,7 +871,7 @@
           <a:p>
             <a:fld id="{1BFFCDDA-1F42-48E8-80CE-21DA24509F0D}" type="datetimeFigureOut">
               <a:rPr lang="en-US" smtClean="0"/>
-              <a:t>11/1/2021</a:t>
+              <a:t>11/20/2021</a:t>
             </a:fld>
             <a:endParaRPr lang="en-US"/>
           </a:p>
@@ -1148,7 +1147,7 @@
           <a:p>
             <a:fld id="{1BFFCDDA-1F42-48E8-80CE-21DA24509F0D}" type="datetimeFigureOut">
               <a:rPr lang="en-US" smtClean="0"/>
-              <a:t>11/1/2021</a:t>
+              <a:t>11/20/2021</a:t>
             </a:fld>
             <a:endParaRPr lang="en-US"/>
           </a:p>
@@ -1416,7 +1415,7 @@
           <a:p>
             <a:fld id="{1BFFCDDA-1F42-48E8-80CE-21DA24509F0D}" type="datetimeFigureOut">
               <a:rPr lang="en-US" smtClean="0"/>
-              <a:t>11/1/2021</a:t>
+              <a:t>11/20/2021</a:t>
             </a:fld>
             <a:endParaRPr lang="en-US"/>
           </a:p>
@@ -1831,7 +1830,7 @@
           <a:p>
             <a:fld id="{1BFFCDDA-1F42-48E8-80CE-21DA24509F0D}" type="datetimeFigureOut">
               <a:rPr lang="en-US" smtClean="0"/>
-              <a:t>11/1/2021</a:t>
+              <a:t>11/20/2021</a:t>
             </a:fld>
             <a:endParaRPr lang="en-US"/>
           </a:p>
@@ -1973,7 +1972,7 @@
           <a:p>
             <a:fld id="{1BFFCDDA-1F42-48E8-80CE-21DA24509F0D}" type="datetimeFigureOut">
               <a:rPr lang="en-US" smtClean="0"/>
-              <a:t>11/1/2021</a:t>
+              <a:t>11/20/2021</a:t>
             </a:fld>
             <a:endParaRPr lang="en-US"/>
           </a:p>
@@ -2086,7 +2085,7 @@
           <a:p>
             <a:fld id="{1BFFCDDA-1F42-48E8-80CE-21DA24509F0D}" type="datetimeFigureOut">
               <a:rPr lang="en-US" smtClean="0"/>
-              <a:t>11/1/2021</a:t>
+              <a:t>11/20/2021</a:t>
             </a:fld>
             <a:endParaRPr lang="en-US"/>
           </a:p>
@@ -2399,7 +2398,7 @@
           <a:p>
             <a:fld id="{1BFFCDDA-1F42-48E8-80CE-21DA24509F0D}" type="datetimeFigureOut">
               <a:rPr lang="en-US" smtClean="0"/>
-              <a:t>11/1/2021</a:t>
+              <a:t>11/20/2021</a:t>
             </a:fld>
             <a:endParaRPr lang="en-US"/>
           </a:p>
@@ -2688,7 +2687,7 @@
           <a:p>
             <a:fld id="{1BFFCDDA-1F42-48E8-80CE-21DA24509F0D}" type="datetimeFigureOut">
               <a:rPr lang="en-US" smtClean="0"/>
-              <a:t>11/1/2021</a:t>
+              <a:t>11/20/2021</a:t>
             </a:fld>
             <a:endParaRPr lang="en-US"/>
           </a:p>
@@ -2931,7 +2930,7 @@
           <a:p>
             <a:fld id="{1BFFCDDA-1F42-48E8-80CE-21DA24509F0D}" type="datetimeFigureOut">
               <a:rPr lang="en-US" smtClean="0"/>
-              <a:t>11/1/2021</a:t>
+              <a:t>11/20/2021</a:t>
             </a:fld>
             <a:endParaRPr lang="en-US"/>
           </a:p>
@@ -3348,95 +3347,12 @@
           <a:chExt cx="0" cy="0"/>
         </a:xfrm>
       </p:grpSpPr>
-      <p:sp>
-        <p:nvSpPr>
-          <p:cNvPr id="2" name="Titel 1">
-            <a:extLst>
-              <a:ext uri="{FF2B5EF4-FFF2-40B4-BE49-F238E27FC236}">
-                <a16:creationId xmlns:a16="http://schemas.microsoft.com/office/drawing/2014/main" id="{31594899-109F-40EA-B4DE-859A8B5E1081}"/>
-              </a:ext>
-            </a:extLst>
-          </p:cNvPr>
-          <p:cNvSpPr>
-            <a:spLocks noGrp="1"/>
-          </p:cNvSpPr>
-          <p:nvPr>
-            <p:ph type="ctrTitle"/>
-          </p:nvPr>
-        </p:nvSpPr>
-        <p:spPr/>
-        <p:txBody>
-          <a:bodyPr/>
-          <a:lstStyle/>
-          <a:p>
-            <a:r>
-              <a:rPr lang="en-US" dirty="0"/>
-              <a:t>Kalasim</a:t>
-            </a:r>
-          </a:p>
-        </p:txBody>
-      </p:sp>
-      <p:sp>
-        <p:nvSpPr>
-          <p:cNvPr id="3" name="Untertitel 2">
-            <a:extLst>
-              <a:ext uri="{FF2B5EF4-FFF2-40B4-BE49-F238E27FC236}">
-                <a16:creationId xmlns:a16="http://schemas.microsoft.com/office/drawing/2014/main" id="{1D26E64E-5639-4419-B959-35092DFAB823}"/>
-              </a:ext>
-            </a:extLst>
-          </p:cNvPr>
-          <p:cNvSpPr>
-            <a:spLocks noGrp="1"/>
-          </p:cNvSpPr>
-          <p:nvPr>
-            <p:ph type="subTitle" idx="1"/>
-          </p:nvPr>
-        </p:nvSpPr>
-        <p:spPr/>
-        <p:txBody>
-          <a:bodyPr/>
-          <a:lstStyle/>
-          <a:p>
-            <a:endParaRPr lang="en-US"/>
-          </a:p>
-        </p:txBody>
-      </p:sp>
-    </p:spTree>
-    <p:extLst>
-      <p:ext uri="{BB962C8B-B14F-4D97-AF65-F5344CB8AC3E}">
-        <p14:creationId xmlns:p14="http://schemas.microsoft.com/office/powerpoint/2010/main" val="4164603116"/>
-      </p:ext>
-    </p:extLst>
-  </p:cSld>
-  <p:clrMapOvr>
-    <a:masterClrMapping/>
-  </p:clrMapOvr>
-</p:sld>
-</file>
-
-<file path=ppt/slides/slide2.xml><?xml version="1.0" encoding="utf-8"?>
-<p:sld xmlns:a="http://schemas.openxmlformats.org/drawingml/2006/main" xmlns:r="http://schemas.openxmlformats.org/officeDocument/2006/relationships" xmlns:p="http://schemas.openxmlformats.org/presentationml/2006/main">
-  <p:cSld>
-    <p:spTree>
-      <p:nvGrpSpPr>
-        <p:cNvPr id="1" name=""/>
-        <p:cNvGrpSpPr/>
-        <p:nvPr/>
-      </p:nvGrpSpPr>
-      <p:grpSpPr>
-        <a:xfrm>
-          <a:off x="0" y="0"/>
-          <a:ext cx="0" cy="0"/>
-          <a:chOff x="0" y="0"/>
-          <a:chExt cx="0" cy="0"/>
-        </a:xfrm>
-      </p:grpSpPr>
       <p:pic>
         <p:nvPicPr>
-          <p:cNvPr id="3" name="Grafik 2">
-            <a:extLst>
-              <a:ext uri="{FF2B5EF4-FFF2-40B4-BE49-F238E27FC236}">
-                <a16:creationId xmlns:a16="http://schemas.microsoft.com/office/drawing/2014/main" id="{CF733478-2858-4D5A-A6EF-52DE70314C09}"/>
+          <p:cNvPr id="9" name="Grafik 8">
+            <a:extLst>
+              <a:ext uri="{FF2B5EF4-FFF2-40B4-BE49-F238E27FC236}">
+                <a16:creationId xmlns:a16="http://schemas.microsoft.com/office/drawing/2014/main" id="{2FC7541B-04B2-434B-B2D3-80DA87556F3F}"/>
               </a:ext>
             </a:extLst>
           </p:cNvPr>
@@ -3453,8 +3369,8 @@
         </p:blipFill>
         <p:spPr>
           <a:xfrm>
-            <a:off x="238535" y="1320984"/>
-            <a:ext cx="5661124" cy="3286584"/>
+            <a:off x="265217" y="1198251"/>
+            <a:ext cx="7334410" cy="3810532"/>
           </a:xfrm>
           <a:prstGeom prst="rect">
             <a:avLst/>
@@ -3915,7 +3831,7 @@
         </p:nvSpPr>
         <p:spPr>
           <a:xfrm>
-            <a:off x="5873946" y="2631744"/>
+            <a:off x="2708695" y="2214364"/>
             <a:ext cx="597704" cy="481068"/>
           </a:xfrm>
           <a:prstGeom prst="ellipse">
@@ -3962,7 +3878,7 @@
         </p:nvSpPr>
         <p:spPr>
           <a:xfrm>
-            <a:off x="3857634" y="2899051"/>
+            <a:off x="4602899" y="3196550"/>
             <a:ext cx="597704" cy="481068"/>
           </a:xfrm>
           <a:prstGeom prst="ellipse">
@@ -4678,7 +4594,7 @@
         </p:blipFill>
         <p:spPr>
           <a:xfrm>
-            <a:off x="1" y="3677618"/>
+            <a:off x="-1" y="3754483"/>
             <a:ext cx="597705" cy="574715"/>
           </a:xfrm>
           <a:prstGeom prst="rect">

</xml_diff>